<commit_message>
New figures corrections, mGal and label size
</commit_message>
<xml_diff>
--- a/manuscript/Fig/edit.pptx
+++ b/manuscript/Fig/edit.pptx
@@ -104,6 +104,22 @@
       </a:defRPr>
     </a:lvl9pPr>
   </p:defaultTextStyle>
+  <p:extLst>
+    <p:ext uri="{EFAFB233-063F-42B5-8137-9DF3F51BA10A}">
+      <p15:sldGuideLst xmlns:p15="http://schemas.microsoft.com/office/powerpoint/2012/main">
+        <p15:guide id="1" orient="horz" pos="2160">
+          <p15:clr>
+            <a:srgbClr val="A4A3A4"/>
+          </p15:clr>
+        </p15:guide>
+        <p15:guide id="2" pos="2880">
+          <p15:clr>
+            <a:srgbClr val="A4A3A4"/>
+          </p15:clr>
+        </p15:guide>
+      </p15:sldGuideLst>
+    </p:ext>
+  </p:extLst>
 </p:presentation>
 </file>
 
@@ -145,10 +161,9 @@
           <a:lstStyle/>
           <a:p>
             <a:r>
-              <a:rPr lang="pt-BR" smtClean="0"/>
+              <a:rPr lang="pt-BR"/>
               <a:t>Clique para editar o estilo do título mestre</a:t>
             </a:r>
-            <a:endParaRPr lang="pt-BR"/>
           </a:p>
         </p:txBody>
       </p:sp>
@@ -264,10 +279,9 @@
           </a:lstStyle>
           <a:p>
             <a:r>
-              <a:rPr lang="pt-BR" smtClean="0"/>
+              <a:rPr lang="pt-BR"/>
               <a:t>Clique para editar o estilo do subtítulo mestre</a:t>
             </a:r>
-            <a:endParaRPr lang="pt-BR"/>
           </a:p>
         </p:txBody>
       </p:sp>
@@ -288,7 +302,7 @@
           <a:p>
             <a:fld id="{2E700DB3-DBF0-4086-B675-117E7A9610B8}" type="datetimeFigureOut">
               <a:rPr lang="pt-BR" smtClean="0"/>
-              <a:t>14/06/2019</a:t>
+              <a:t>05/05/2020</a:t>
             </a:fld>
             <a:endParaRPr lang="pt-BR"/>
           </a:p>
@@ -377,10 +391,9 @@
           <a:lstStyle/>
           <a:p>
             <a:r>
-              <a:rPr lang="pt-BR" smtClean="0"/>
+              <a:rPr lang="pt-BR"/>
               <a:t>Clique para editar o estilo do título mestre</a:t>
             </a:r>
-            <a:endParaRPr lang="pt-BR"/>
           </a:p>
         </p:txBody>
       </p:sp>
@@ -401,38 +414,37 @@
           <a:p>
             <a:pPr lvl="0"/>
             <a:r>
-              <a:rPr lang="pt-BR" smtClean="0"/>
+              <a:rPr lang="pt-BR"/>
               <a:t>Clique para editar os estilos do texto mestre</a:t>
             </a:r>
           </a:p>
           <a:p>
             <a:pPr lvl="1"/>
             <a:r>
-              <a:rPr lang="pt-BR" smtClean="0"/>
+              <a:rPr lang="pt-BR"/>
               <a:t>Segundo nível</a:t>
             </a:r>
           </a:p>
           <a:p>
             <a:pPr lvl="2"/>
             <a:r>
-              <a:rPr lang="pt-BR" smtClean="0"/>
+              <a:rPr lang="pt-BR"/>
               <a:t>Terceiro nível</a:t>
             </a:r>
           </a:p>
           <a:p>
             <a:pPr lvl="3"/>
             <a:r>
-              <a:rPr lang="pt-BR" smtClean="0"/>
+              <a:rPr lang="pt-BR"/>
               <a:t>Quarto nível</a:t>
             </a:r>
           </a:p>
           <a:p>
             <a:pPr lvl="4"/>
             <a:r>
-              <a:rPr lang="pt-BR" smtClean="0"/>
+              <a:rPr lang="pt-BR"/>
               <a:t>Quinto nível</a:t>
             </a:r>
-            <a:endParaRPr lang="pt-BR"/>
           </a:p>
         </p:txBody>
       </p:sp>
@@ -453,7 +465,7 @@
           <a:p>
             <a:fld id="{2E700DB3-DBF0-4086-B675-117E7A9610B8}" type="datetimeFigureOut">
               <a:rPr lang="pt-BR" smtClean="0"/>
-              <a:t>14/06/2019</a:t>
+              <a:t>05/05/2020</a:t>
             </a:fld>
             <a:endParaRPr lang="pt-BR"/>
           </a:p>
@@ -547,10 +559,9 @@
           <a:lstStyle/>
           <a:p>
             <a:r>
-              <a:rPr lang="pt-BR" smtClean="0"/>
+              <a:rPr lang="pt-BR"/>
               <a:t>Clique para editar o estilo do título mestre</a:t>
             </a:r>
-            <a:endParaRPr lang="pt-BR"/>
           </a:p>
         </p:txBody>
       </p:sp>
@@ -576,38 +587,37 @@
           <a:p>
             <a:pPr lvl="0"/>
             <a:r>
-              <a:rPr lang="pt-BR" smtClean="0"/>
+              <a:rPr lang="pt-BR"/>
               <a:t>Clique para editar os estilos do texto mestre</a:t>
             </a:r>
           </a:p>
           <a:p>
             <a:pPr lvl="1"/>
             <a:r>
-              <a:rPr lang="pt-BR" smtClean="0"/>
+              <a:rPr lang="pt-BR"/>
               <a:t>Segundo nível</a:t>
             </a:r>
           </a:p>
           <a:p>
             <a:pPr lvl="2"/>
             <a:r>
-              <a:rPr lang="pt-BR" smtClean="0"/>
+              <a:rPr lang="pt-BR"/>
               <a:t>Terceiro nível</a:t>
             </a:r>
           </a:p>
           <a:p>
             <a:pPr lvl="3"/>
             <a:r>
-              <a:rPr lang="pt-BR" smtClean="0"/>
+              <a:rPr lang="pt-BR"/>
               <a:t>Quarto nível</a:t>
             </a:r>
           </a:p>
           <a:p>
             <a:pPr lvl="4"/>
             <a:r>
-              <a:rPr lang="pt-BR" smtClean="0"/>
+              <a:rPr lang="pt-BR"/>
               <a:t>Quinto nível</a:t>
             </a:r>
-            <a:endParaRPr lang="pt-BR"/>
           </a:p>
         </p:txBody>
       </p:sp>
@@ -628,7 +638,7 @@
           <a:p>
             <a:fld id="{2E700DB3-DBF0-4086-B675-117E7A9610B8}" type="datetimeFigureOut">
               <a:rPr lang="pt-BR" smtClean="0"/>
-              <a:t>14/06/2019</a:t>
+              <a:t>05/05/2020</a:t>
             </a:fld>
             <a:endParaRPr lang="pt-BR"/>
           </a:p>
@@ -717,10 +727,9 @@
           <a:lstStyle/>
           <a:p>
             <a:r>
-              <a:rPr lang="pt-BR" smtClean="0"/>
+              <a:rPr lang="pt-BR"/>
               <a:t>Clique para editar o estilo do título mestre</a:t>
             </a:r>
-            <a:endParaRPr lang="pt-BR"/>
           </a:p>
         </p:txBody>
       </p:sp>
@@ -741,38 +750,37 @@
           <a:p>
             <a:pPr lvl="0"/>
             <a:r>
-              <a:rPr lang="pt-BR" smtClean="0"/>
+              <a:rPr lang="pt-BR"/>
               <a:t>Clique para editar os estilos do texto mestre</a:t>
             </a:r>
           </a:p>
           <a:p>
             <a:pPr lvl="1"/>
             <a:r>
-              <a:rPr lang="pt-BR" smtClean="0"/>
+              <a:rPr lang="pt-BR"/>
               <a:t>Segundo nível</a:t>
             </a:r>
           </a:p>
           <a:p>
             <a:pPr lvl="2"/>
             <a:r>
-              <a:rPr lang="pt-BR" smtClean="0"/>
+              <a:rPr lang="pt-BR"/>
               <a:t>Terceiro nível</a:t>
             </a:r>
           </a:p>
           <a:p>
             <a:pPr lvl="3"/>
             <a:r>
-              <a:rPr lang="pt-BR" smtClean="0"/>
+              <a:rPr lang="pt-BR"/>
               <a:t>Quarto nível</a:t>
             </a:r>
           </a:p>
           <a:p>
             <a:pPr lvl="4"/>
             <a:r>
-              <a:rPr lang="pt-BR" smtClean="0"/>
+              <a:rPr lang="pt-BR"/>
               <a:t>Quinto nível</a:t>
             </a:r>
-            <a:endParaRPr lang="pt-BR"/>
           </a:p>
         </p:txBody>
       </p:sp>
@@ -793,7 +801,7 @@
           <a:p>
             <a:fld id="{2E700DB3-DBF0-4086-B675-117E7A9610B8}" type="datetimeFigureOut">
               <a:rPr lang="pt-BR" smtClean="0"/>
-              <a:t>14/06/2019</a:t>
+              <a:t>05/05/2020</a:t>
             </a:fld>
             <a:endParaRPr lang="pt-BR"/>
           </a:p>
@@ -891,10 +899,9 @@
           </a:lstStyle>
           <a:p>
             <a:r>
-              <a:rPr lang="pt-BR" smtClean="0"/>
+              <a:rPr lang="pt-BR"/>
               <a:t>Clique para editar o estilo do título mestre</a:t>
             </a:r>
-            <a:endParaRPr lang="pt-BR"/>
           </a:p>
         </p:txBody>
       </p:sp>
@@ -1011,7 +1018,7 @@
           <a:p>
             <a:pPr lvl="0"/>
             <a:r>
-              <a:rPr lang="pt-BR" smtClean="0"/>
+              <a:rPr lang="pt-BR"/>
               <a:t>Clique para editar os estilos do texto mestre</a:t>
             </a:r>
           </a:p>
@@ -1034,7 +1041,7 @@
           <a:p>
             <a:fld id="{2E700DB3-DBF0-4086-B675-117E7A9610B8}" type="datetimeFigureOut">
               <a:rPr lang="pt-BR" smtClean="0"/>
-              <a:t>14/06/2019</a:t>
+              <a:t>05/05/2020</a:t>
             </a:fld>
             <a:endParaRPr lang="pt-BR"/>
           </a:p>
@@ -1123,10 +1130,9 @@
           <a:lstStyle/>
           <a:p>
             <a:r>
-              <a:rPr lang="pt-BR" smtClean="0"/>
+              <a:rPr lang="pt-BR"/>
               <a:t>Clique para editar o estilo do título mestre</a:t>
             </a:r>
-            <a:endParaRPr lang="pt-BR"/>
           </a:p>
         </p:txBody>
       </p:sp>
@@ -1180,38 +1186,37 @@
           <a:p>
             <a:pPr lvl="0"/>
             <a:r>
-              <a:rPr lang="pt-BR" smtClean="0"/>
+              <a:rPr lang="pt-BR"/>
               <a:t>Clique para editar os estilos do texto mestre</a:t>
             </a:r>
           </a:p>
           <a:p>
             <a:pPr lvl="1"/>
             <a:r>
-              <a:rPr lang="pt-BR" smtClean="0"/>
+              <a:rPr lang="pt-BR"/>
               <a:t>Segundo nível</a:t>
             </a:r>
           </a:p>
           <a:p>
             <a:pPr lvl="2"/>
             <a:r>
-              <a:rPr lang="pt-BR" smtClean="0"/>
+              <a:rPr lang="pt-BR"/>
               <a:t>Terceiro nível</a:t>
             </a:r>
           </a:p>
           <a:p>
             <a:pPr lvl="3"/>
             <a:r>
-              <a:rPr lang="pt-BR" smtClean="0"/>
+              <a:rPr lang="pt-BR"/>
               <a:t>Quarto nível</a:t>
             </a:r>
           </a:p>
           <a:p>
             <a:pPr lvl="4"/>
             <a:r>
-              <a:rPr lang="pt-BR" smtClean="0"/>
+              <a:rPr lang="pt-BR"/>
               <a:t>Quinto nível</a:t>
             </a:r>
-            <a:endParaRPr lang="pt-BR"/>
           </a:p>
         </p:txBody>
       </p:sp>
@@ -1265,38 +1270,37 @@
           <a:p>
             <a:pPr lvl="0"/>
             <a:r>
-              <a:rPr lang="pt-BR" smtClean="0"/>
+              <a:rPr lang="pt-BR"/>
               <a:t>Clique para editar os estilos do texto mestre</a:t>
             </a:r>
           </a:p>
           <a:p>
             <a:pPr lvl="1"/>
             <a:r>
-              <a:rPr lang="pt-BR" smtClean="0"/>
+              <a:rPr lang="pt-BR"/>
               <a:t>Segundo nível</a:t>
             </a:r>
           </a:p>
           <a:p>
             <a:pPr lvl="2"/>
             <a:r>
-              <a:rPr lang="pt-BR" smtClean="0"/>
+              <a:rPr lang="pt-BR"/>
               <a:t>Terceiro nível</a:t>
             </a:r>
           </a:p>
           <a:p>
             <a:pPr lvl="3"/>
             <a:r>
-              <a:rPr lang="pt-BR" smtClean="0"/>
+              <a:rPr lang="pt-BR"/>
               <a:t>Quarto nível</a:t>
             </a:r>
           </a:p>
           <a:p>
             <a:pPr lvl="4"/>
             <a:r>
-              <a:rPr lang="pt-BR" smtClean="0"/>
+              <a:rPr lang="pt-BR"/>
               <a:t>Quinto nível</a:t>
             </a:r>
-            <a:endParaRPr lang="pt-BR"/>
           </a:p>
         </p:txBody>
       </p:sp>
@@ -1317,7 +1321,7 @@
           <a:p>
             <a:fld id="{2E700DB3-DBF0-4086-B675-117E7A9610B8}" type="datetimeFigureOut">
               <a:rPr lang="pt-BR" smtClean="0"/>
-              <a:t>14/06/2019</a:t>
+              <a:t>05/05/2020</a:t>
             </a:fld>
             <a:endParaRPr lang="pt-BR"/>
           </a:p>
@@ -1410,10 +1414,9 @@
           </a:lstStyle>
           <a:p>
             <a:r>
-              <a:rPr lang="pt-BR" smtClean="0"/>
+              <a:rPr lang="pt-BR"/>
               <a:t>Clique para editar o estilo do título mestre</a:t>
             </a:r>
-            <a:endParaRPr lang="pt-BR"/>
           </a:p>
         </p:txBody>
       </p:sp>
@@ -1476,7 +1479,7 @@
           <a:p>
             <a:pPr lvl="0"/>
             <a:r>
-              <a:rPr lang="pt-BR" smtClean="0"/>
+              <a:rPr lang="pt-BR"/>
               <a:t>Clique para editar os estilos do texto mestre</a:t>
             </a:r>
           </a:p>
@@ -1532,38 +1535,37 @@
           <a:p>
             <a:pPr lvl="0"/>
             <a:r>
-              <a:rPr lang="pt-BR" smtClean="0"/>
+              <a:rPr lang="pt-BR"/>
               <a:t>Clique para editar os estilos do texto mestre</a:t>
             </a:r>
           </a:p>
           <a:p>
             <a:pPr lvl="1"/>
             <a:r>
-              <a:rPr lang="pt-BR" smtClean="0"/>
+              <a:rPr lang="pt-BR"/>
               <a:t>Segundo nível</a:t>
             </a:r>
           </a:p>
           <a:p>
             <a:pPr lvl="2"/>
             <a:r>
-              <a:rPr lang="pt-BR" smtClean="0"/>
+              <a:rPr lang="pt-BR"/>
               <a:t>Terceiro nível</a:t>
             </a:r>
           </a:p>
           <a:p>
             <a:pPr lvl="3"/>
             <a:r>
-              <a:rPr lang="pt-BR" smtClean="0"/>
+              <a:rPr lang="pt-BR"/>
               <a:t>Quarto nível</a:t>
             </a:r>
           </a:p>
           <a:p>
             <a:pPr lvl="4"/>
             <a:r>
-              <a:rPr lang="pt-BR" smtClean="0"/>
+              <a:rPr lang="pt-BR"/>
               <a:t>Quinto nível</a:t>
             </a:r>
-            <a:endParaRPr lang="pt-BR"/>
           </a:p>
         </p:txBody>
       </p:sp>
@@ -1626,7 +1628,7 @@
           <a:p>
             <a:pPr lvl="0"/>
             <a:r>
-              <a:rPr lang="pt-BR" smtClean="0"/>
+              <a:rPr lang="pt-BR"/>
               <a:t>Clique para editar os estilos do texto mestre</a:t>
             </a:r>
           </a:p>
@@ -1682,38 +1684,37 @@
           <a:p>
             <a:pPr lvl="0"/>
             <a:r>
-              <a:rPr lang="pt-BR" smtClean="0"/>
+              <a:rPr lang="pt-BR"/>
               <a:t>Clique para editar os estilos do texto mestre</a:t>
             </a:r>
           </a:p>
           <a:p>
             <a:pPr lvl="1"/>
             <a:r>
-              <a:rPr lang="pt-BR" smtClean="0"/>
+              <a:rPr lang="pt-BR"/>
               <a:t>Segundo nível</a:t>
             </a:r>
           </a:p>
           <a:p>
             <a:pPr lvl="2"/>
             <a:r>
-              <a:rPr lang="pt-BR" smtClean="0"/>
+              <a:rPr lang="pt-BR"/>
               <a:t>Terceiro nível</a:t>
             </a:r>
           </a:p>
           <a:p>
             <a:pPr lvl="3"/>
             <a:r>
-              <a:rPr lang="pt-BR" smtClean="0"/>
+              <a:rPr lang="pt-BR"/>
               <a:t>Quarto nível</a:t>
             </a:r>
           </a:p>
           <a:p>
             <a:pPr lvl="4"/>
             <a:r>
-              <a:rPr lang="pt-BR" smtClean="0"/>
+              <a:rPr lang="pt-BR"/>
               <a:t>Quinto nível</a:t>
             </a:r>
-            <a:endParaRPr lang="pt-BR"/>
           </a:p>
         </p:txBody>
       </p:sp>
@@ -1734,7 +1735,7 @@
           <a:p>
             <a:fld id="{2E700DB3-DBF0-4086-B675-117E7A9610B8}" type="datetimeFigureOut">
               <a:rPr lang="pt-BR" smtClean="0"/>
-              <a:t>14/06/2019</a:t>
+              <a:t>05/05/2020</a:t>
             </a:fld>
             <a:endParaRPr lang="pt-BR"/>
           </a:p>
@@ -1823,10 +1824,9 @@
           <a:lstStyle/>
           <a:p>
             <a:r>
-              <a:rPr lang="pt-BR" smtClean="0"/>
+              <a:rPr lang="pt-BR"/>
               <a:t>Clique para editar o estilo do título mestre</a:t>
             </a:r>
-            <a:endParaRPr lang="pt-BR"/>
           </a:p>
         </p:txBody>
       </p:sp>
@@ -1847,7 +1847,7 @@
           <a:p>
             <a:fld id="{2E700DB3-DBF0-4086-B675-117E7A9610B8}" type="datetimeFigureOut">
               <a:rPr lang="pt-BR" smtClean="0"/>
-              <a:t>14/06/2019</a:t>
+              <a:t>05/05/2020</a:t>
             </a:fld>
             <a:endParaRPr lang="pt-BR"/>
           </a:p>
@@ -1937,7 +1937,7 @@
           <a:p>
             <a:fld id="{2E700DB3-DBF0-4086-B675-117E7A9610B8}" type="datetimeFigureOut">
               <a:rPr lang="pt-BR" smtClean="0"/>
-              <a:t>14/06/2019</a:t>
+              <a:t>05/05/2020</a:t>
             </a:fld>
             <a:endParaRPr lang="pt-BR"/>
           </a:p>
@@ -2035,10 +2035,9 @@
           </a:lstStyle>
           <a:p>
             <a:r>
-              <a:rPr lang="pt-BR" smtClean="0"/>
+              <a:rPr lang="pt-BR"/>
               <a:t>Clique para editar o estilo do título mestre</a:t>
             </a:r>
-            <a:endParaRPr lang="pt-BR"/>
           </a:p>
         </p:txBody>
       </p:sp>
@@ -2092,38 +2091,37 @@
           <a:p>
             <a:pPr lvl="0"/>
             <a:r>
-              <a:rPr lang="pt-BR" smtClean="0"/>
+              <a:rPr lang="pt-BR"/>
               <a:t>Clique para editar os estilos do texto mestre</a:t>
             </a:r>
           </a:p>
           <a:p>
             <a:pPr lvl="1"/>
             <a:r>
-              <a:rPr lang="pt-BR" smtClean="0"/>
+              <a:rPr lang="pt-BR"/>
               <a:t>Segundo nível</a:t>
             </a:r>
           </a:p>
           <a:p>
             <a:pPr lvl="2"/>
             <a:r>
-              <a:rPr lang="pt-BR" smtClean="0"/>
+              <a:rPr lang="pt-BR"/>
               <a:t>Terceiro nível</a:t>
             </a:r>
           </a:p>
           <a:p>
             <a:pPr lvl="3"/>
             <a:r>
-              <a:rPr lang="pt-BR" smtClean="0"/>
+              <a:rPr lang="pt-BR"/>
               <a:t>Quarto nível</a:t>
             </a:r>
           </a:p>
           <a:p>
             <a:pPr lvl="4"/>
             <a:r>
-              <a:rPr lang="pt-BR" smtClean="0"/>
+              <a:rPr lang="pt-BR"/>
               <a:t>Quinto nível</a:t>
             </a:r>
-            <a:endParaRPr lang="pt-BR"/>
           </a:p>
         </p:txBody>
       </p:sp>
@@ -2186,7 +2184,7 @@
           <a:p>
             <a:pPr lvl="0"/>
             <a:r>
-              <a:rPr lang="pt-BR" smtClean="0"/>
+              <a:rPr lang="pt-BR"/>
               <a:t>Clique para editar os estilos do texto mestre</a:t>
             </a:r>
           </a:p>
@@ -2209,7 +2207,7 @@
           <a:p>
             <a:fld id="{2E700DB3-DBF0-4086-B675-117E7A9610B8}" type="datetimeFigureOut">
               <a:rPr lang="pt-BR" smtClean="0"/>
-              <a:t>14/06/2019</a:t>
+              <a:t>05/05/2020</a:t>
             </a:fld>
             <a:endParaRPr lang="pt-BR"/>
           </a:p>
@@ -2307,10 +2305,9 @@
           </a:lstStyle>
           <a:p>
             <a:r>
-              <a:rPr lang="pt-BR" smtClean="0"/>
+              <a:rPr lang="pt-BR"/>
               <a:t>Clique para editar o estilo do título mestre</a:t>
             </a:r>
-            <a:endParaRPr lang="pt-BR"/>
           </a:p>
         </p:txBody>
       </p:sp>
@@ -2434,7 +2431,7 @@
           <a:p>
             <a:pPr lvl="0"/>
             <a:r>
-              <a:rPr lang="pt-BR" smtClean="0"/>
+              <a:rPr lang="pt-BR"/>
               <a:t>Clique para editar os estilos do texto mestre</a:t>
             </a:r>
           </a:p>
@@ -2457,7 +2454,7 @@
           <a:p>
             <a:fld id="{2E700DB3-DBF0-4086-B675-117E7A9610B8}" type="datetimeFigureOut">
               <a:rPr lang="pt-BR" smtClean="0"/>
-              <a:t>14/06/2019</a:t>
+              <a:t>05/05/2020</a:t>
             </a:fld>
             <a:endParaRPr lang="pt-BR"/>
           </a:p>
@@ -2561,10 +2558,9 @@
           <a:lstStyle/>
           <a:p>
             <a:r>
-              <a:rPr lang="pt-BR" smtClean="0"/>
+              <a:rPr lang="pt-BR"/>
               <a:t>Clique para editar o estilo do título mestre</a:t>
             </a:r>
-            <a:endParaRPr lang="pt-BR"/>
           </a:p>
         </p:txBody>
       </p:sp>
@@ -2595,38 +2591,37 @@
           <a:p>
             <a:pPr lvl="0"/>
             <a:r>
-              <a:rPr lang="pt-BR" smtClean="0"/>
+              <a:rPr lang="pt-BR"/>
               <a:t>Clique para editar os estilos do texto mestre</a:t>
             </a:r>
           </a:p>
           <a:p>
             <a:pPr lvl="1"/>
             <a:r>
-              <a:rPr lang="pt-BR" smtClean="0"/>
+              <a:rPr lang="pt-BR"/>
               <a:t>Segundo nível</a:t>
             </a:r>
           </a:p>
           <a:p>
             <a:pPr lvl="2"/>
             <a:r>
-              <a:rPr lang="pt-BR" smtClean="0"/>
+              <a:rPr lang="pt-BR"/>
               <a:t>Terceiro nível</a:t>
             </a:r>
           </a:p>
           <a:p>
             <a:pPr lvl="3"/>
             <a:r>
-              <a:rPr lang="pt-BR" smtClean="0"/>
+              <a:rPr lang="pt-BR"/>
               <a:t>Quarto nível</a:t>
             </a:r>
           </a:p>
           <a:p>
             <a:pPr lvl="4"/>
             <a:r>
-              <a:rPr lang="pt-BR" smtClean="0"/>
+              <a:rPr lang="pt-BR"/>
               <a:t>Quinto nível</a:t>
             </a:r>
-            <a:endParaRPr lang="pt-BR"/>
           </a:p>
         </p:txBody>
       </p:sp>
@@ -2665,7 +2660,7 @@
           <a:p>
             <a:fld id="{2E700DB3-DBF0-4086-B675-117E7A9610B8}" type="datetimeFigureOut">
               <a:rPr lang="pt-BR" smtClean="0"/>
-              <a:t>14/06/2019</a:t>
+              <a:t>05/05/2020</a:t>
             </a:fld>
             <a:endParaRPr lang="pt-BR"/>
           </a:p>
@@ -3037,9 +3032,15 @@
       </p:grpSpPr>
       <p:pic>
         <p:nvPicPr>
-          <p:cNvPr id="1026" name="Picture 2" descr="C:\Users\diego_000\Dropbox\Projeto Doutorado\Fast_Eq_Toeplitz\paper-toeplitz\tex\latex\seg\Fig\carajas_real_data.png"/>
+          <p:cNvPr id="7" name="Imagem 6" descr="Uma imagem contendo estrela&#10;&#10;Descrição gerada automaticamente">
+            <a:extLst>
+              <a:ext uri="{FF2B5EF4-FFF2-40B4-BE49-F238E27FC236}">
+                <a16:creationId xmlns:a16="http://schemas.microsoft.com/office/drawing/2014/main" id="{A3A06454-6030-4C0F-91EF-320894D02F07}"/>
+              </a:ext>
+            </a:extLst>
+          </p:cNvPr>
           <p:cNvPicPr>
-            <a:picLocks noChangeAspect="1" noChangeArrowheads="1"/>
+            <a:picLocks noChangeAspect="1"/>
           </p:cNvPicPr>
           <p:nvPr/>
         </p:nvPicPr>
@@ -3051,29 +3052,18 @@
               </a:ext>
             </a:extLst>
           </a:blip>
-          <a:srcRect/>
           <a:stretch>
             <a:fillRect/>
           </a:stretch>
         </p:blipFill>
-        <p:spPr bwMode="auto">
+        <p:spPr>
           <a:xfrm>
-            <a:off x="0" y="-67597"/>
-            <a:ext cx="9396536" cy="7047401"/>
+            <a:off x="0" y="0"/>
+            <a:ext cx="9144000" cy="6858000"/>
           </a:xfrm>
           <a:prstGeom prst="rect">
             <a:avLst/>
           </a:prstGeom>
-          <a:noFill/>
-          <a:extLst>
-            <a:ext uri="{909E8E84-426E-40DD-AFC4-6F175D3DCCD1}">
-              <a14:hiddenFill xmlns:a14="http://schemas.microsoft.com/office/drawing/2010/main">
-                <a:solidFill>
-                  <a:srgbClr val="FFFFFF"/>
-                </a:solidFill>
-              </a14:hiddenFill>
-            </a:ext>
-          </a:extLst>
         </p:spPr>
       </p:pic>
       <p:pic>
@@ -3097,7 +3087,7 @@
         </p:blipFill>
         <p:spPr bwMode="auto">
           <a:xfrm>
-            <a:off x="1187624" y="4558764"/>
+            <a:off x="1134000" y="4536000"/>
             <a:ext cx="1757421" cy="1534532"/>
           </a:xfrm>
           <a:prstGeom prst="rect">

</xml_diff>

<commit_message>
Revert "New figures without "Gz" label"
</commit_message>
<xml_diff>
--- a/manuscript/Fig/edit.pptx
+++ b/manuscript/Fig/edit.pptx
@@ -104,22 +104,6 @@
       </a:defRPr>
     </a:lvl9pPr>
   </p:defaultTextStyle>
-  <p:extLst>
-    <p:ext uri="{EFAFB233-063F-42B5-8137-9DF3F51BA10A}">
-      <p15:sldGuideLst xmlns:p15="http://schemas.microsoft.com/office/powerpoint/2012/main">
-        <p15:guide id="1" orient="horz" pos="2160">
-          <p15:clr>
-            <a:srgbClr val="A4A3A4"/>
-          </p15:clr>
-        </p15:guide>
-        <p15:guide id="2" pos="2880">
-          <p15:clr>
-            <a:srgbClr val="A4A3A4"/>
-          </p15:clr>
-        </p15:guide>
-      </p15:sldGuideLst>
-    </p:ext>
-  </p:extLst>
 </p:presentation>
 </file>
 
@@ -161,9 +145,10 @@
           <a:lstStyle/>
           <a:p>
             <a:r>
-              <a:rPr lang="pt-BR"/>
+              <a:rPr lang="pt-BR" smtClean="0"/>
               <a:t>Clique para editar o estilo do título mestre</a:t>
             </a:r>
+            <a:endParaRPr lang="pt-BR"/>
           </a:p>
         </p:txBody>
       </p:sp>
@@ -279,9 +264,10 @@
           </a:lstStyle>
           <a:p>
             <a:r>
-              <a:rPr lang="pt-BR"/>
+              <a:rPr lang="pt-BR" smtClean="0"/>
               <a:t>Clique para editar o estilo do subtítulo mestre</a:t>
             </a:r>
+            <a:endParaRPr lang="pt-BR"/>
           </a:p>
         </p:txBody>
       </p:sp>
@@ -302,7 +288,7 @@
           <a:p>
             <a:fld id="{2E700DB3-DBF0-4086-B675-117E7A9610B8}" type="datetimeFigureOut">
               <a:rPr lang="pt-BR" smtClean="0"/>
-              <a:t>05/05/2020</a:t>
+              <a:t>14/06/2019</a:t>
             </a:fld>
             <a:endParaRPr lang="pt-BR"/>
           </a:p>
@@ -391,9 +377,10 @@
           <a:lstStyle/>
           <a:p>
             <a:r>
-              <a:rPr lang="pt-BR"/>
+              <a:rPr lang="pt-BR" smtClean="0"/>
               <a:t>Clique para editar o estilo do título mestre</a:t>
             </a:r>
+            <a:endParaRPr lang="pt-BR"/>
           </a:p>
         </p:txBody>
       </p:sp>
@@ -414,37 +401,38 @@
           <a:p>
             <a:pPr lvl="0"/>
             <a:r>
-              <a:rPr lang="pt-BR"/>
+              <a:rPr lang="pt-BR" smtClean="0"/>
               <a:t>Clique para editar os estilos do texto mestre</a:t>
             </a:r>
           </a:p>
           <a:p>
             <a:pPr lvl="1"/>
             <a:r>
-              <a:rPr lang="pt-BR"/>
+              <a:rPr lang="pt-BR" smtClean="0"/>
               <a:t>Segundo nível</a:t>
             </a:r>
           </a:p>
           <a:p>
             <a:pPr lvl="2"/>
             <a:r>
-              <a:rPr lang="pt-BR"/>
+              <a:rPr lang="pt-BR" smtClean="0"/>
               <a:t>Terceiro nível</a:t>
             </a:r>
           </a:p>
           <a:p>
             <a:pPr lvl="3"/>
             <a:r>
-              <a:rPr lang="pt-BR"/>
+              <a:rPr lang="pt-BR" smtClean="0"/>
               <a:t>Quarto nível</a:t>
             </a:r>
           </a:p>
           <a:p>
             <a:pPr lvl="4"/>
             <a:r>
-              <a:rPr lang="pt-BR"/>
+              <a:rPr lang="pt-BR" smtClean="0"/>
               <a:t>Quinto nível</a:t>
             </a:r>
+            <a:endParaRPr lang="pt-BR"/>
           </a:p>
         </p:txBody>
       </p:sp>
@@ -465,7 +453,7 @@
           <a:p>
             <a:fld id="{2E700DB3-DBF0-4086-B675-117E7A9610B8}" type="datetimeFigureOut">
               <a:rPr lang="pt-BR" smtClean="0"/>
-              <a:t>05/05/2020</a:t>
+              <a:t>14/06/2019</a:t>
             </a:fld>
             <a:endParaRPr lang="pt-BR"/>
           </a:p>
@@ -559,9 +547,10 @@
           <a:lstStyle/>
           <a:p>
             <a:r>
-              <a:rPr lang="pt-BR"/>
+              <a:rPr lang="pt-BR" smtClean="0"/>
               <a:t>Clique para editar o estilo do título mestre</a:t>
             </a:r>
+            <a:endParaRPr lang="pt-BR"/>
           </a:p>
         </p:txBody>
       </p:sp>
@@ -587,37 +576,38 @@
           <a:p>
             <a:pPr lvl="0"/>
             <a:r>
-              <a:rPr lang="pt-BR"/>
+              <a:rPr lang="pt-BR" smtClean="0"/>
               <a:t>Clique para editar os estilos do texto mestre</a:t>
             </a:r>
           </a:p>
           <a:p>
             <a:pPr lvl="1"/>
             <a:r>
-              <a:rPr lang="pt-BR"/>
+              <a:rPr lang="pt-BR" smtClean="0"/>
               <a:t>Segundo nível</a:t>
             </a:r>
           </a:p>
           <a:p>
             <a:pPr lvl="2"/>
             <a:r>
-              <a:rPr lang="pt-BR"/>
+              <a:rPr lang="pt-BR" smtClean="0"/>
               <a:t>Terceiro nível</a:t>
             </a:r>
           </a:p>
           <a:p>
             <a:pPr lvl="3"/>
             <a:r>
-              <a:rPr lang="pt-BR"/>
+              <a:rPr lang="pt-BR" smtClean="0"/>
               <a:t>Quarto nível</a:t>
             </a:r>
           </a:p>
           <a:p>
             <a:pPr lvl="4"/>
             <a:r>
-              <a:rPr lang="pt-BR"/>
+              <a:rPr lang="pt-BR" smtClean="0"/>
               <a:t>Quinto nível</a:t>
             </a:r>
+            <a:endParaRPr lang="pt-BR"/>
           </a:p>
         </p:txBody>
       </p:sp>
@@ -638,7 +628,7 @@
           <a:p>
             <a:fld id="{2E700DB3-DBF0-4086-B675-117E7A9610B8}" type="datetimeFigureOut">
               <a:rPr lang="pt-BR" smtClean="0"/>
-              <a:t>05/05/2020</a:t>
+              <a:t>14/06/2019</a:t>
             </a:fld>
             <a:endParaRPr lang="pt-BR"/>
           </a:p>
@@ -727,9 +717,10 @@
           <a:lstStyle/>
           <a:p>
             <a:r>
-              <a:rPr lang="pt-BR"/>
+              <a:rPr lang="pt-BR" smtClean="0"/>
               <a:t>Clique para editar o estilo do título mestre</a:t>
             </a:r>
+            <a:endParaRPr lang="pt-BR"/>
           </a:p>
         </p:txBody>
       </p:sp>
@@ -750,37 +741,38 @@
           <a:p>
             <a:pPr lvl="0"/>
             <a:r>
-              <a:rPr lang="pt-BR"/>
+              <a:rPr lang="pt-BR" smtClean="0"/>
               <a:t>Clique para editar os estilos do texto mestre</a:t>
             </a:r>
           </a:p>
           <a:p>
             <a:pPr lvl="1"/>
             <a:r>
-              <a:rPr lang="pt-BR"/>
+              <a:rPr lang="pt-BR" smtClean="0"/>
               <a:t>Segundo nível</a:t>
             </a:r>
           </a:p>
           <a:p>
             <a:pPr lvl="2"/>
             <a:r>
-              <a:rPr lang="pt-BR"/>
+              <a:rPr lang="pt-BR" smtClean="0"/>
               <a:t>Terceiro nível</a:t>
             </a:r>
           </a:p>
           <a:p>
             <a:pPr lvl="3"/>
             <a:r>
-              <a:rPr lang="pt-BR"/>
+              <a:rPr lang="pt-BR" smtClean="0"/>
               <a:t>Quarto nível</a:t>
             </a:r>
           </a:p>
           <a:p>
             <a:pPr lvl="4"/>
             <a:r>
-              <a:rPr lang="pt-BR"/>
+              <a:rPr lang="pt-BR" smtClean="0"/>
               <a:t>Quinto nível</a:t>
             </a:r>
+            <a:endParaRPr lang="pt-BR"/>
           </a:p>
         </p:txBody>
       </p:sp>
@@ -801,7 +793,7 @@
           <a:p>
             <a:fld id="{2E700DB3-DBF0-4086-B675-117E7A9610B8}" type="datetimeFigureOut">
               <a:rPr lang="pt-BR" smtClean="0"/>
-              <a:t>05/05/2020</a:t>
+              <a:t>14/06/2019</a:t>
             </a:fld>
             <a:endParaRPr lang="pt-BR"/>
           </a:p>
@@ -899,9 +891,10 @@
           </a:lstStyle>
           <a:p>
             <a:r>
-              <a:rPr lang="pt-BR"/>
+              <a:rPr lang="pt-BR" smtClean="0"/>
               <a:t>Clique para editar o estilo do título mestre</a:t>
             </a:r>
+            <a:endParaRPr lang="pt-BR"/>
           </a:p>
         </p:txBody>
       </p:sp>
@@ -1018,7 +1011,7 @@
           <a:p>
             <a:pPr lvl="0"/>
             <a:r>
-              <a:rPr lang="pt-BR"/>
+              <a:rPr lang="pt-BR" smtClean="0"/>
               <a:t>Clique para editar os estilos do texto mestre</a:t>
             </a:r>
           </a:p>
@@ -1041,7 +1034,7 @@
           <a:p>
             <a:fld id="{2E700DB3-DBF0-4086-B675-117E7A9610B8}" type="datetimeFigureOut">
               <a:rPr lang="pt-BR" smtClean="0"/>
-              <a:t>05/05/2020</a:t>
+              <a:t>14/06/2019</a:t>
             </a:fld>
             <a:endParaRPr lang="pt-BR"/>
           </a:p>
@@ -1130,9 +1123,10 @@
           <a:lstStyle/>
           <a:p>
             <a:r>
-              <a:rPr lang="pt-BR"/>
+              <a:rPr lang="pt-BR" smtClean="0"/>
               <a:t>Clique para editar o estilo do título mestre</a:t>
             </a:r>
+            <a:endParaRPr lang="pt-BR"/>
           </a:p>
         </p:txBody>
       </p:sp>
@@ -1186,37 +1180,38 @@
           <a:p>
             <a:pPr lvl="0"/>
             <a:r>
-              <a:rPr lang="pt-BR"/>
+              <a:rPr lang="pt-BR" smtClean="0"/>
               <a:t>Clique para editar os estilos do texto mestre</a:t>
             </a:r>
           </a:p>
           <a:p>
             <a:pPr lvl="1"/>
             <a:r>
-              <a:rPr lang="pt-BR"/>
+              <a:rPr lang="pt-BR" smtClean="0"/>
               <a:t>Segundo nível</a:t>
             </a:r>
           </a:p>
           <a:p>
             <a:pPr lvl="2"/>
             <a:r>
-              <a:rPr lang="pt-BR"/>
+              <a:rPr lang="pt-BR" smtClean="0"/>
               <a:t>Terceiro nível</a:t>
             </a:r>
           </a:p>
           <a:p>
             <a:pPr lvl="3"/>
             <a:r>
-              <a:rPr lang="pt-BR"/>
+              <a:rPr lang="pt-BR" smtClean="0"/>
               <a:t>Quarto nível</a:t>
             </a:r>
           </a:p>
           <a:p>
             <a:pPr lvl="4"/>
             <a:r>
-              <a:rPr lang="pt-BR"/>
+              <a:rPr lang="pt-BR" smtClean="0"/>
               <a:t>Quinto nível</a:t>
             </a:r>
+            <a:endParaRPr lang="pt-BR"/>
           </a:p>
         </p:txBody>
       </p:sp>
@@ -1270,37 +1265,38 @@
           <a:p>
             <a:pPr lvl="0"/>
             <a:r>
-              <a:rPr lang="pt-BR"/>
+              <a:rPr lang="pt-BR" smtClean="0"/>
               <a:t>Clique para editar os estilos do texto mestre</a:t>
             </a:r>
           </a:p>
           <a:p>
             <a:pPr lvl="1"/>
             <a:r>
-              <a:rPr lang="pt-BR"/>
+              <a:rPr lang="pt-BR" smtClean="0"/>
               <a:t>Segundo nível</a:t>
             </a:r>
           </a:p>
           <a:p>
             <a:pPr lvl="2"/>
             <a:r>
-              <a:rPr lang="pt-BR"/>
+              <a:rPr lang="pt-BR" smtClean="0"/>
               <a:t>Terceiro nível</a:t>
             </a:r>
           </a:p>
           <a:p>
             <a:pPr lvl="3"/>
             <a:r>
-              <a:rPr lang="pt-BR"/>
+              <a:rPr lang="pt-BR" smtClean="0"/>
               <a:t>Quarto nível</a:t>
             </a:r>
           </a:p>
           <a:p>
             <a:pPr lvl="4"/>
             <a:r>
-              <a:rPr lang="pt-BR"/>
+              <a:rPr lang="pt-BR" smtClean="0"/>
               <a:t>Quinto nível</a:t>
             </a:r>
+            <a:endParaRPr lang="pt-BR"/>
           </a:p>
         </p:txBody>
       </p:sp>
@@ -1321,7 +1317,7 @@
           <a:p>
             <a:fld id="{2E700DB3-DBF0-4086-B675-117E7A9610B8}" type="datetimeFigureOut">
               <a:rPr lang="pt-BR" smtClean="0"/>
-              <a:t>05/05/2020</a:t>
+              <a:t>14/06/2019</a:t>
             </a:fld>
             <a:endParaRPr lang="pt-BR"/>
           </a:p>
@@ -1414,9 +1410,10 @@
           </a:lstStyle>
           <a:p>
             <a:r>
-              <a:rPr lang="pt-BR"/>
+              <a:rPr lang="pt-BR" smtClean="0"/>
               <a:t>Clique para editar o estilo do título mestre</a:t>
             </a:r>
+            <a:endParaRPr lang="pt-BR"/>
           </a:p>
         </p:txBody>
       </p:sp>
@@ -1479,7 +1476,7 @@
           <a:p>
             <a:pPr lvl="0"/>
             <a:r>
-              <a:rPr lang="pt-BR"/>
+              <a:rPr lang="pt-BR" smtClean="0"/>
               <a:t>Clique para editar os estilos do texto mestre</a:t>
             </a:r>
           </a:p>
@@ -1535,37 +1532,38 @@
           <a:p>
             <a:pPr lvl="0"/>
             <a:r>
-              <a:rPr lang="pt-BR"/>
+              <a:rPr lang="pt-BR" smtClean="0"/>
               <a:t>Clique para editar os estilos do texto mestre</a:t>
             </a:r>
           </a:p>
           <a:p>
             <a:pPr lvl="1"/>
             <a:r>
-              <a:rPr lang="pt-BR"/>
+              <a:rPr lang="pt-BR" smtClean="0"/>
               <a:t>Segundo nível</a:t>
             </a:r>
           </a:p>
           <a:p>
             <a:pPr lvl="2"/>
             <a:r>
-              <a:rPr lang="pt-BR"/>
+              <a:rPr lang="pt-BR" smtClean="0"/>
               <a:t>Terceiro nível</a:t>
             </a:r>
           </a:p>
           <a:p>
             <a:pPr lvl="3"/>
             <a:r>
-              <a:rPr lang="pt-BR"/>
+              <a:rPr lang="pt-BR" smtClean="0"/>
               <a:t>Quarto nível</a:t>
             </a:r>
           </a:p>
           <a:p>
             <a:pPr lvl="4"/>
             <a:r>
-              <a:rPr lang="pt-BR"/>
+              <a:rPr lang="pt-BR" smtClean="0"/>
               <a:t>Quinto nível</a:t>
             </a:r>
+            <a:endParaRPr lang="pt-BR"/>
           </a:p>
         </p:txBody>
       </p:sp>
@@ -1628,7 +1626,7 @@
           <a:p>
             <a:pPr lvl="0"/>
             <a:r>
-              <a:rPr lang="pt-BR"/>
+              <a:rPr lang="pt-BR" smtClean="0"/>
               <a:t>Clique para editar os estilos do texto mestre</a:t>
             </a:r>
           </a:p>
@@ -1684,37 +1682,38 @@
           <a:p>
             <a:pPr lvl="0"/>
             <a:r>
-              <a:rPr lang="pt-BR"/>
+              <a:rPr lang="pt-BR" smtClean="0"/>
               <a:t>Clique para editar os estilos do texto mestre</a:t>
             </a:r>
           </a:p>
           <a:p>
             <a:pPr lvl="1"/>
             <a:r>
-              <a:rPr lang="pt-BR"/>
+              <a:rPr lang="pt-BR" smtClean="0"/>
               <a:t>Segundo nível</a:t>
             </a:r>
           </a:p>
           <a:p>
             <a:pPr lvl="2"/>
             <a:r>
-              <a:rPr lang="pt-BR"/>
+              <a:rPr lang="pt-BR" smtClean="0"/>
               <a:t>Terceiro nível</a:t>
             </a:r>
           </a:p>
           <a:p>
             <a:pPr lvl="3"/>
             <a:r>
-              <a:rPr lang="pt-BR"/>
+              <a:rPr lang="pt-BR" smtClean="0"/>
               <a:t>Quarto nível</a:t>
             </a:r>
           </a:p>
           <a:p>
             <a:pPr lvl="4"/>
             <a:r>
-              <a:rPr lang="pt-BR"/>
+              <a:rPr lang="pt-BR" smtClean="0"/>
               <a:t>Quinto nível</a:t>
             </a:r>
+            <a:endParaRPr lang="pt-BR"/>
           </a:p>
         </p:txBody>
       </p:sp>
@@ -1735,7 +1734,7 @@
           <a:p>
             <a:fld id="{2E700DB3-DBF0-4086-B675-117E7A9610B8}" type="datetimeFigureOut">
               <a:rPr lang="pt-BR" smtClean="0"/>
-              <a:t>05/05/2020</a:t>
+              <a:t>14/06/2019</a:t>
             </a:fld>
             <a:endParaRPr lang="pt-BR"/>
           </a:p>
@@ -1824,9 +1823,10 @@
           <a:lstStyle/>
           <a:p>
             <a:r>
-              <a:rPr lang="pt-BR"/>
+              <a:rPr lang="pt-BR" smtClean="0"/>
               <a:t>Clique para editar o estilo do título mestre</a:t>
             </a:r>
+            <a:endParaRPr lang="pt-BR"/>
           </a:p>
         </p:txBody>
       </p:sp>
@@ -1847,7 +1847,7 @@
           <a:p>
             <a:fld id="{2E700DB3-DBF0-4086-B675-117E7A9610B8}" type="datetimeFigureOut">
               <a:rPr lang="pt-BR" smtClean="0"/>
-              <a:t>05/05/2020</a:t>
+              <a:t>14/06/2019</a:t>
             </a:fld>
             <a:endParaRPr lang="pt-BR"/>
           </a:p>
@@ -1937,7 +1937,7 @@
           <a:p>
             <a:fld id="{2E700DB3-DBF0-4086-B675-117E7A9610B8}" type="datetimeFigureOut">
               <a:rPr lang="pt-BR" smtClean="0"/>
-              <a:t>05/05/2020</a:t>
+              <a:t>14/06/2019</a:t>
             </a:fld>
             <a:endParaRPr lang="pt-BR"/>
           </a:p>
@@ -2035,9 +2035,10 @@
           </a:lstStyle>
           <a:p>
             <a:r>
-              <a:rPr lang="pt-BR"/>
+              <a:rPr lang="pt-BR" smtClean="0"/>
               <a:t>Clique para editar o estilo do título mestre</a:t>
             </a:r>
+            <a:endParaRPr lang="pt-BR"/>
           </a:p>
         </p:txBody>
       </p:sp>
@@ -2091,37 +2092,38 @@
           <a:p>
             <a:pPr lvl="0"/>
             <a:r>
-              <a:rPr lang="pt-BR"/>
+              <a:rPr lang="pt-BR" smtClean="0"/>
               <a:t>Clique para editar os estilos do texto mestre</a:t>
             </a:r>
           </a:p>
           <a:p>
             <a:pPr lvl="1"/>
             <a:r>
-              <a:rPr lang="pt-BR"/>
+              <a:rPr lang="pt-BR" smtClean="0"/>
               <a:t>Segundo nível</a:t>
             </a:r>
           </a:p>
           <a:p>
             <a:pPr lvl="2"/>
             <a:r>
-              <a:rPr lang="pt-BR"/>
+              <a:rPr lang="pt-BR" smtClean="0"/>
               <a:t>Terceiro nível</a:t>
             </a:r>
           </a:p>
           <a:p>
             <a:pPr lvl="3"/>
             <a:r>
-              <a:rPr lang="pt-BR"/>
+              <a:rPr lang="pt-BR" smtClean="0"/>
               <a:t>Quarto nível</a:t>
             </a:r>
           </a:p>
           <a:p>
             <a:pPr lvl="4"/>
             <a:r>
-              <a:rPr lang="pt-BR"/>
+              <a:rPr lang="pt-BR" smtClean="0"/>
               <a:t>Quinto nível</a:t>
             </a:r>
+            <a:endParaRPr lang="pt-BR"/>
           </a:p>
         </p:txBody>
       </p:sp>
@@ -2184,7 +2186,7 @@
           <a:p>
             <a:pPr lvl="0"/>
             <a:r>
-              <a:rPr lang="pt-BR"/>
+              <a:rPr lang="pt-BR" smtClean="0"/>
               <a:t>Clique para editar os estilos do texto mestre</a:t>
             </a:r>
           </a:p>
@@ -2207,7 +2209,7 @@
           <a:p>
             <a:fld id="{2E700DB3-DBF0-4086-B675-117E7A9610B8}" type="datetimeFigureOut">
               <a:rPr lang="pt-BR" smtClean="0"/>
-              <a:t>05/05/2020</a:t>
+              <a:t>14/06/2019</a:t>
             </a:fld>
             <a:endParaRPr lang="pt-BR"/>
           </a:p>
@@ -2305,9 +2307,10 @@
           </a:lstStyle>
           <a:p>
             <a:r>
-              <a:rPr lang="pt-BR"/>
+              <a:rPr lang="pt-BR" smtClean="0"/>
               <a:t>Clique para editar o estilo do título mestre</a:t>
             </a:r>
+            <a:endParaRPr lang="pt-BR"/>
           </a:p>
         </p:txBody>
       </p:sp>
@@ -2431,7 +2434,7 @@
           <a:p>
             <a:pPr lvl="0"/>
             <a:r>
-              <a:rPr lang="pt-BR"/>
+              <a:rPr lang="pt-BR" smtClean="0"/>
               <a:t>Clique para editar os estilos do texto mestre</a:t>
             </a:r>
           </a:p>
@@ -2454,7 +2457,7 @@
           <a:p>
             <a:fld id="{2E700DB3-DBF0-4086-B675-117E7A9610B8}" type="datetimeFigureOut">
               <a:rPr lang="pt-BR" smtClean="0"/>
-              <a:t>05/05/2020</a:t>
+              <a:t>14/06/2019</a:t>
             </a:fld>
             <a:endParaRPr lang="pt-BR"/>
           </a:p>
@@ -2558,9 +2561,10 @@
           <a:lstStyle/>
           <a:p>
             <a:r>
-              <a:rPr lang="pt-BR"/>
+              <a:rPr lang="pt-BR" smtClean="0"/>
               <a:t>Clique para editar o estilo do título mestre</a:t>
             </a:r>
+            <a:endParaRPr lang="pt-BR"/>
           </a:p>
         </p:txBody>
       </p:sp>
@@ -2591,37 +2595,38 @@
           <a:p>
             <a:pPr lvl="0"/>
             <a:r>
-              <a:rPr lang="pt-BR"/>
+              <a:rPr lang="pt-BR" smtClean="0"/>
               <a:t>Clique para editar os estilos do texto mestre</a:t>
             </a:r>
           </a:p>
           <a:p>
             <a:pPr lvl="1"/>
             <a:r>
-              <a:rPr lang="pt-BR"/>
+              <a:rPr lang="pt-BR" smtClean="0"/>
               <a:t>Segundo nível</a:t>
             </a:r>
           </a:p>
           <a:p>
             <a:pPr lvl="2"/>
             <a:r>
-              <a:rPr lang="pt-BR"/>
+              <a:rPr lang="pt-BR" smtClean="0"/>
               <a:t>Terceiro nível</a:t>
             </a:r>
           </a:p>
           <a:p>
             <a:pPr lvl="3"/>
             <a:r>
-              <a:rPr lang="pt-BR"/>
+              <a:rPr lang="pt-BR" smtClean="0"/>
               <a:t>Quarto nível</a:t>
             </a:r>
           </a:p>
           <a:p>
             <a:pPr lvl="4"/>
             <a:r>
-              <a:rPr lang="pt-BR"/>
+              <a:rPr lang="pt-BR" smtClean="0"/>
               <a:t>Quinto nível</a:t>
             </a:r>
+            <a:endParaRPr lang="pt-BR"/>
           </a:p>
         </p:txBody>
       </p:sp>
@@ -2660,7 +2665,7 @@
           <a:p>
             <a:fld id="{2E700DB3-DBF0-4086-B675-117E7A9610B8}" type="datetimeFigureOut">
               <a:rPr lang="pt-BR" smtClean="0"/>
-              <a:t>05/05/2020</a:t>
+              <a:t>14/06/2019</a:t>
             </a:fld>
             <a:endParaRPr lang="pt-BR"/>
           </a:p>
@@ -3032,15 +3037,9 @@
       </p:grpSpPr>
       <p:pic>
         <p:nvPicPr>
-          <p:cNvPr id="7" name="Imagem 6" descr="Uma imagem contendo estrela&#10;&#10;Descrição gerada automaticamente">
-            <a:extLst>
-              <a:ext uri="{FF2B5EF4-FFF2-40B4-BE49-F238E27FC236}">
-                <a16:creationId xmlns:a16="http://schemas.microsoft.com/office/drawing/2014/main" id="{A3A06454-6030-4C0F-91EF-320894D02F07}"/>
-              </a:ext>
-            </a:extLst>
-          </p:cNvPr>
+          <p:cNvPr id="1026" name="Picture 2" descr="C:\Users\diego_000\Dropbox\Projeto Doutorado\Fast_Eq_Toeplitz\paper-toeplitz\tex\latex\seg\Fig\carajas_real_data.png"/>
           <p:cNvPicPr>
-            <a:picLocks noChangeAspect="1"/>
+            <a:picLocks noChangeAspect="1" noChangeArrowheads="1"/>
           </p:cNvPicPr>
           <p:nvPr/>
         </p:nvPicPr>
@@ -3052,18 +3051,29 @@
               </a:ext>
             </a:extLst>
           </a:blip>
+          <a:srcRect/>
           <a:stretch>
             <a:fillRect/>
           </a:stretch>
         </p:blipFill>
-        <p:spPr>
+        <p:spPr bwMode="auto">
           <a:xfrm>
-            <a:off x="0" y="0"/>
-            <a:ext cx="9144000" cy="6858000"/>
+            <a:off x="0" y="-67597"/>
+            <a:ext cx="9396536" cy="7047401"/>
           </a:xfrm>
           <a:prstGeom prst="rect">
             <a:avLst/>
           </a:prstGeom>
+          <a:noFill/>
+          <a:extLst>
+            <a:ext uri="{909E8E84-426E-40DD-AFC4-6F175D3DCCD1}">
+              <a14:hiddenFill xmlns:a14="http://schemas.microsoft.com/office/drawing/2010/main">
+                <a:solidFill>
+                  <a:srgbClr val="FFFFFF"/>
+                </a:solidFill>
+              </a14:hiddenFill>
+            </a:ext>
+          </a:extLst>
         </p:spPr>
       </p:pic>
       <p:pic>
@@ -3087,7 +3097,7 @@
         </p:blipFill>
         <p:spPr bwMode="auto">
           <a:xfrm>
-            <a:off x="1134000" y="4536000"/>
+            <a:off x="1187624" y="4558764"/>
             <a:ext cx="1757421" cy="1534532"/>
           </a:xfrm>
           <a:prstGeom prst="rect">

</xml_diff>